<commit_message>
Added "Experiment" to future plans
</commit_message>
<xml_diff>
--- a/schedule.pptx
+++ b/schedule.pptx
@@ -288,7 +288,7 @@
           <a:p>
             <a:fld id="{42A15FF1-0452-504A-B640-787979F1EB22}" type="datetimeFigureOut">
               <a:rPr lang="en-US" smtClean="0"/>
-              <a:t>5/21/12</a:t>
+              <a:t>5/23/12</a:t>
             </a:fld>
             <a:endParaRPr lang="en-US"/>
           </a:p>
@@ -458,7 +458,7 @@
           <a:p>
             <a:fld id="{42A15FF1-0452-504A-B640-787979F1EB22}" type="datetimeFigureOut">
               <a:rPr lang="en-US" smtClean="0"/>
-              <a:t>5/21/12</a:t>
+              <a:t>5/23/12</a:t>
             </a:fld>
             <a:endParaRPr lang="en-US"/>
           </a:p>
@@ -638,7 +638,7 @@
           <a:p>
             <a:fld id="{42A15FF1-0452-504A-B640-787979F1EB22}" type="datetimeFigureOut">
               <a:rPr lang="en-US" smtClean="0"/>
-              <a:t>5/21/12</a:t>
+              <a:t>5/23/12</a:t>
             </a:fld>
             <a:endParaRPr lang="en-US"/>
           </a:p>
@@ -808,7 +808,7 @@
           <a:p>
             <a:fld id="{42A15FF1-0452-504A-B640-787979F1EB22}" type="datetimeFigureOut">
               <a:rPr lang="en-US" smtClean="0"/>
-              <a:t>5/21/12</a:t>
+              <a:t>5/23/12</a:t>
             </a:fld>
             <a:endParaRPr lang="en-US"/>
           </a:p>
@@ -1054,7 +1054,7 @@
           <a:p>
             <a:fld id="{42A15FF1-0452-504A-B640-787979F1EB22}" type="datetimeFigureOut">
               <a:rPr lang="en-US" smtClean="0"/>
-              <a:t>5/21/12</a:t>
+              <a:t>5/23/12</a:t>
             </a:fld>
             <a:endParaRPr lang="en-US"/>
           </a:p>
@@ -1342,7 +1342,7 @@
           <a:p>
             <a:fld id="{42A15FF1-0452-504A-B640-787979F1EB22}" type="datetimeFigureOut">
               <a:rPr lang="en-US" smtClean="0"/>
-              <a:t>5/21/12</a:t>
+              <a:t>5/23/12</a:t>
             </a:fld>
             <a:endParaRPr lang="en-US"/>
           </a:p>
@@ -1764,7 +1764,7 @@
           <a:p>
             <a:fld id="{42A15FF1-0452-504A-B640-787979F1EB22}" type="datetimeFigureOut">
               <a:rPr lang="en-US" smtClean="0"/>
-              <a:t>5/21/12</a:t>
+              <a:t>5/23/12</a:t>
             </a:fld>
             <a:endParaRPr lang="en-US"/>
           </a:p>
@@ -1882,7 +1882,7 @@
           <a:p>
             <a:fld id="{42A15FF1-0452-504A-B640-787979F1EB22}" type="datetimeFigureOut">
               <a:rPr lang="en-US" smtClean="0"/>
-              <a:t>5/21/12</a:t>
+              <a:t>5/23/12</a:t>
             </a:fld>
             <a:endParaRPr lang="en-US"/>
           </a:p>
@@ -1977,7 +1977,7 @@
           <a:p>
             <a:fld id="{42A15FF1-0452-504A-B640-787979F1EB22}" type="datetimeFigureOut">
               <a:rPr lang="en-US" smtClean="0"/>
-              <a:t>5/21/12</a:t>
+              <a:t>5/23/12</a:t>
             </a:fld>
             <a:endParaRPr lang="en-US"/>
           </a:p>
@@ -2254,7 +2254,7 @@
           <a:p>
             <a:fld id="{42A15FF1-0452-504A-B640-787979F1EB22}" type="datetimeFigureOut">
               <a:rPr lang="en-US" smtClean="0"/>
-              <a:t>5/21/12</a:t>
+              <a:t>5/23/12</a:t>
             </a:fld>
             <a:endParaRPr lang="en-US"/>
           </a:p>
@@ -2507,7 +2507,7 @@
           <a:p>
             <a:fld id="{42A15FF1-0452-504A-B640-787979F1EB22}" type="datetimeFigureOut">
               <a:rPr lang="en-US" smtClean="0"/>
-              <a:t>5/21/12</a:t>
+              <a:t>5/23/12</a:t>
             </a:fld>
             <a:endParaRPr lang="en-US"/>
           </a:p>
@@ -2720,7 +2720,7 @@
           <a:p>
             <a:fld id="{42A15FF1-0452-504A-B640-787979F1EB22}" type="datetimeFigureOut">
               <a:rPr lang="en-US" smtClean="0"/>
-              <a:t>5/21/12</a:t>
+              <a:t>5/23/12</a:t>
             </a:fld>
             <a:endParaRPr lang="en-US"/>
           </a:p>
@@ -3104,7 +3104,7 @@
         <p:spPr>
           <a:xfrm>
             <a:off x="762000" y="2362199"/>
-            <a:ext cx="7543800" cy="1828801"/>
+            <a:ext cx="7543800" cy="2057401"/>
           </a:xfrm>
           <a:prstGeom prst="roundRect">
             <a:avLst/>
@@ -3196,7 +3196,7 @@
         <p:spPr>
           <a:xfrm>
             <a:off x="3306236" y="381000"/>
-            <a:ext cx="1828800" cy="4114800"/>
+            <a:ext cx="1828800" cy="4191000"/>
           </a:xfrm>
           <a:prstGeom prst="rect">
             <a:avLst/>
@@ -3488,7 +3488,7 @@
         </p:nvCxnSpPr>
         <p:spPr>
           <a:xfrm>
-            <a:off x="1477436" y="4495800"/>
+            <a:off x="1477436" y="4572000"/>
             <a:ext cx="5913964" cy="0"/>
           </a:xfrm>
           <a:prstGeom prst="straightConnector1">
@@ -3524,7 +3524,7 @@
         </p:nvCxnSpPr>
         <p:spPr>
           <a:xfrm flipV="1">
-            <a:off x="1477436" y="4419600"/>
+            <a:off x="1477436" y="4495800"/>
             <a:ext cx="0" cy="152400"/>
           </a:xfrm>
           <a:prstGeom prst="line">
@@ -3559,7 +3559,7 @@
         </p:nvCxnSpPr>
         <p:spPr>
           <a:xfrm flipV="1">
-            <a:off x="3306236" y="4419600"/>
+            <a:off x="3306236" y="4495800"/>
             <a:ext cx="0" cy="152400"/>
           </a:xfrm>
           <a:prstGeom prst="line">
@@ -3594,7 +3594,7 @@
         </p:nvCxnSpPr>
         <p:spPr>
           <a:xfrm flipV="1">
-            <a:off x="5135036" y="4419600"/>
+            <a:off x="5135036" y="4495800"/>
             <a:ext cx="0" cy="152400"/>
           </a:xfrm>
           <a:prstGeom prst="line">
@@ -3629,7 +3629,7 @@
         </p:nvCxnSpPr>
         <p:spPr>
           <a:xfrm flipV="1">
-            <a:off x="2362200" y="4419600"/>
+            <a:off x="2362200" y="4495800"/>
             <a:ext cx="0" cy="152400"/>
           </a:xfrm>
           <a:prstGeom prst="line">
@@ -3664,7 +3664,7 @@
         </p:nvCxnSpPr>
         <p:spPr>
           <a:xfrm flipV="1">
-            <a:off x="4191000" y="4419600"/>
+            <a:off x="4191000" y="4495800"/>
             <a:ext cx="0" cy="152400"/>
           </a:xfrm>
           <a:prstGeom prst="line">
@@ -3699,7 +3699,7 @@
         </p:nvCxnSpPr>
         <p:spPr>
           <a:xfrm flipV="1">
-            <a:off x="6019800" y="4419600"/>
+            <a:off x="6019800" y="4495800"/>
             <a:ext cx="0" cy="152400"/>
           </a:xfrm>
           <a:prstGeom prst="line">
@@ -3793,7 +3793,7 @@
         </p:nvSpPr>
         <p:spPr>
           <a:xfrm>
-            <a:off x="3115736" y="4569023"/>
+            <a:off x="3115736" y="4645223"/>
             <a:ext cx="381000" cy="307777"/>
           </a:xfrm>
           <a:prstGeom prst="rect">
@@ -3830,7 +3830,7 @@
         </p:nvSpPr>
         <p:spPr>
           <a:xfrm>
-            <a:off x="4000500" y="4569023"/>
+            <a:off x="4000500" y="4645223"/>
             <a:ext cx="381000" cy="307777"/>
           </a:xfrm>
           <a:prstGeom prst="rect">
@@ -3867,7 +3867,7 @@
         </p:nvSpPr>
         <p:spPr>
           <a:xfrm>
-            <a:off x="4953000" y="4569023"/>
+            <a:off x="4953000" y="4645223"/>
             <a:ext cx="381000" cy="307777"/>
           </a:xfrm>
           <a:prstGeom prst="rect">
@@ -3904,7 +3904,7 @@
         </p:nvSpPr>
         <p:spPr>
           <a:xfrm>
-            <a:off x="5829300" y="4569023"/>
+            <a:off x="5829300" y="4645223"/>
             <a:ext cx="381000" cy="307777"/>
           </a:xfrm>
           <a:prstGeom prst="rect">
@@ -3941,7 +3941,7 @@
         </p:nvSpPr>
         <p:spPr>
           <a:xfrm>
-            <a:off x="1295400" y="4569023"/>
+            <a:off x="1295400" y="4645223"/>
             <a:ext cx="381000" cy="307777"/>
           </a:xfrm>
           <a:prstGeom prst="rect">
@@ -3978,7 +3978,7 @@
         </p:nvSpPr>
         <p:spPr>
           <a:xfrm>
-            <a:off x="2180164" y="4569023"/>
+            <a:off x="2180164" y="4645223"/>
             <a:ext cx="381000" cy="307777"/>
           </a:xfrm>
           <a:prstGeom prst="rect">
@@ -4268,7 +4268,7 @@
         <p:spPr>
           <a:xfrm>
             <a:off x="6019800" y="3581400"/>
-            <a:ext cx="2133600" cy="457200"/>
+            <a:ext cx="2133600" cy="609600"/>
           </a:xfrm>
           <a:prstGeom prst="rect">
             <a:avLst/>
@@ -4310,7 +4310,7 @@
                 <a:latin typeface="Arial"/>
                 <a:cs typeface="Arial"/>
               </a:rPr>
-              <a:t>Evaluation</a:t>
+              <a:t>Evaluation &amp; Experimentation</a:t>
             </a:r>
             <a:endParaRPr lang="en-US" sz="1600" dirty="0">
               <a:solidFill>

</xml_diff>